<commit_message>
Update my first presentation.
</commit_message>
<xml_diff>
--- a/reports/Mar07/Q&A.pptx
+++ b/reports/Mar07/Q&A.pptx
@@ -108,6 +108,11 @@
       </a:defRPr>
     </a:lvl9pPr>
   </p:defaultTextStyle>
+  <p:extLst>
+    <p:ext uri="{EFAFB233-063F-42B5-8137-9DF3F51BA10A}">
+      <p15:sldGuideLst xmlns:p15="http://schemas.microsoft.com/office/powerpoint/2012/main"/>
+    </p:ext>
+  </p:extLst>
 </p:presentation>
 </file>
 
@@ -258,7 +263,7 @@
           <a:p>
             <a:fld id="{A653CCA7-7F4D-4FA4-B2FD-A0366D11B289}" type="datetimeFigureOut">
               <a:rPr lang="en-US" smtClean="0"/>
-              <a:t>3/13/2018</a:t>
+              <a:t>3/14/2018</a:t>
             </a:fld>
             <a:endParaRPr lang="en-US"/>
           </a:p>
@@ -456,7 +461,7 @@
           <a:p>
             <a:fld id="{A653CCA7-7F4D-4FA4-B2FD-A0366D11B289}" type="datetimeFigureOut">
               <a:rPr lang="en-US" smtClean="0"/>
-              <a:t>3/13/2018</a:t>
+              <a:t>3/14/2018</a:t>
             </a:fld>
             <a:endParaRPr lang="en-US"/>
           </a:p>
@@ -664,7 +669,7 @@
           <a:p>
             <a:fld id="{A653CCA7-7F4D-4FA4-B2FD-A0366D11B289}" type="datetimeFigureOut">
               <a:rPr lang="en-US" smtClean="0"/>
-              <a:t>3/13/2018</a:t>
+              <a:t>3/14/2018</a:t>
             </a:fld>
             <a:endParaRPr lang="en-US"/>
           </a:p>
@@ -862,7 +867,7 @@
           <a:p>
             <a:fld id="{A653CCA7-7F4D-4FA4-B2FD-A0366D11B289}" type="datetimeFigureOut">
               <a:rPr lang="en-US" smtClean="0"/>
-              <a:t>3/13/2018</a:t>
+              <a:t>3/14/2018</a:t>
             </a:fld>
             <a:endParaRPr lang="en-US"/>
           </a:p>
@@ -1137,7 +1142,7 @@
           <a:p>
             <a:fld id="{A653CCA7-7F4D-4FA4-B2FD-A0366D11B289}" type="datetimeFigureOut">
               <a:rPr lang="en-US" smtClean="0"/>
-              <a:t>3/13/2018</a:t>
+              <a:t>3/14/2018</a:t>
             </a:fld>
             <a:endParaRPr lang="en-US"/>
           </a:p>
@@ -1402,7 +1407,7 @@
           <a:p>
             <a:fld id="{A653CCA7-7F4D-4FA4-B2FD-A0366D11B289}" type="datetimeFigureOut">
               <a:rPr lang="en-US" smtClean="0"/>
-              <a:t>3/13/2018</a:t>
+              <a:t>3/14/2018</a:t>
             </a:fld>
             <a:endParaRPr lang="en-US"/>
           </a:p>
@@ -1814,7 +1819,7 @@
           <a:p>
             <a:fld id="{A653CCA7-7F4D-4FA4-B2FD-A0366D11B289}" type="datetimeFigureOut">
               <a:rPr lang="en-US" smtClean="0"/>
-              <a:t>3/13/2018</a:t>
+              <a:t>3/14/2018</a:t>
             </a:fld>
             <a:endParaRPr lang="en-US"/>
           </a:p>
@@ -1955,7 +1960,7 @@
           <a:p>
             <a:fld id="{A653CCA7-7F4D-4FA4-B2FD-A0366D11B289}" type="datetimeFigureOut">
               <a:rPr lang="en-US" smtClean="0"/>
-              <a:t>3/13/2018</a:t>
+              <a:t>3/14/2018</a:t>
             </a:fld>
             <a:endParaRPr lang="en-US"/>
           </a:p>
@@ -2068,7 +2073,7 @@
           <a:p>
             <a:fld id="{A653CCA7-7F4D-4FA4-B2FD-A0366D11B289}" type="datetimeFigureOut">
               <a:rPr lang="en-US" smtClean="0"/>
-              <a:t>3/13/2018</a:t>
+              <a:t>3/14/2018</a:t>
             </a:fld>
             <a:endParaRPr lang="en-US"/>
           </a:p>
@@ -2379,7 +2384,7 @@
           <a:p>
             <a:fld id="{A653CCA7-7F4D-4FA4-B2FD-A0366D11B289}" type="datetimeFigureOut">
               <a:rPr lang="en-US" smtClean="0"/>
-              <a:t>3/13/2018</a:t>
+              <a:t>3/14/2018</a:t>
             </a:fld>
             <a:endParaRPr lang="en-US"/>
           </a:p>
@@ -2667,7 +2672,7 @@
           <a:p>
             <a:fld id="{A653CCA7-7F4D-4FA4-B2FD-A0366D11B289}" type="datetimeFigureOut">
               <a:rPr lang="en-US" smtClean="0"/>
-              <a:t>3/13/2018</a:t>
+              <a:t>3/14/2018</a:t>
             </a:fld>
             <a:endParaRPr lang="en-US"/>
           </a:p>
@@ -2908,7 +2913,7 @@
           <a:p>
             <a:fld id="{A653CCA7-7F4D-4FA4-B2FD-A0366D11B289}" type="datetimeFigureOut">
               <a:rPr lang="en-US" smtClean="0"/>
-              <a:t>3/13/2018</a:t>
+              <a:t>3/14/2018</a:t>
             </a:fld>
             <a:endParaRPr lang="en-US"/>
           </a:p>
@@ -3582,10 +3587,10 @@
       </p:sp>
       <p:pic>
         <p:nvPicPr>
-          <p:cNvPr id="5" name="Picture 4">
-            <a:extLst>
-              <a:ext uri="{FF2B5EF4-FFF2-40B4-BE49-F238E27FC236}">
-                <a16:creationId xmlns:a16="http://schemas.microsoft.com/office/drawing/2014/main" id="{96889BD9-CC5E-4944-9A5F-21DD4D042404}"/>
+          <p:cNvPr id="6" name="Picture 5">
+            <a:extLst>
+              <a:ext uri="{FF2B5EF4-FFF2-40B4-BE49-F238E27FC236}">
+                <a16:creationId xmlns:a16="http://schemas.microsoft.com/office/drawing/2014/main" id="{3991C45A-47E6-44EE-A2B5-44F70D4B691D}"/>
               </a:ext>
             </a:extLst>
           </p:cNvPr>
@@ -3602,8 +3607,8 @@
         </p:blipFill>
         <p:spPr>
           <a:xfrm>
-            <a:off x="7050919" y="1570449"/>
-            <a:ext cx="4351867" cy="4453150"/>
+            <a:off x="465968" y="2015962"/>
+            <a:ext cx="5774267" cy="3050450"/>
           </a:xfrm>
           <a:prstGeom prst="rect">
             <a:avLst/>
@@ -3612,10 +3617,10 @@
       </p:pic>
       <p:pic>
         <p:nvPicPr>
-          <p:cNvPr id="6" name="Picture 5">
-            <a:extLst>
-              <a:ext uri="{FF2B5EF4-FFF2-40B4-BE49-F238E27FC236}">
-                <a16:creationId xmlns:a16="http://schemas.microsoft.com/office/drawing/2014/main" id="{3991C45A-47E6-44EE-A2B5-44F70D4B691D}"/>
+          <p:cNvPr id="7" name="Picture 6">
+            <a:extLst>
+              <a:ext uri="{FF2B5EF4-FFF2-40B4-BE49-F238E27FC236}">
+                <a16:creationId xmlns:a16="http://schemas.microsoft.com/office/drawing/2014/main" id="{209B008A-1930-41EA-A6FD-4DD4D38F68FF}"/>
               </a:ext>
             </a:extLst>
           </p:cNvPr>
@@ -3632,49 +3637,14 @@
         </p:blipFill>
         <p:spPr>
           <a:xfrm>
-            <a:off x="838200" y="2000971"/>
-            <a:ext cx="5774267" cy="3050450"/>
+            <a:off x="6338609" y="2122781"/>
+            <a:ext cx="5673776" cy="2836811"/>
           </a:xfrm>
           <a:prstGeom prst="rect">
             <a:avLst/>
           </a:prstGeom>
         </p:spPr>
       </p:pic>
-      <p:sp>
-        <p:nvSpPr>
-          <p:cNvPr id="9" name="TextBox 8">
-            <a:extLst>
-              <a:ext uri="{FF2B5EF4-FFF2-40B4-BE49-F238E27FC236}">
-                <a16:creationId xmlns:a16="http://schemas.microsoft.com/office/drawing/2014/main" id="{BE7175A3-1794-4C3B-97CD-8ADB042E1619}"/>
-              </a:ext>
-            </a:extLst>
-          </p:cNvPr>
-          <p:cNvSpPr txBox="1"/>
-          <p:nvPr/>
-        </p:nvSpPr>
-        <p:spPr>
-          <a:xfrm>
-            <a:off x="1702297" y="5219700"/>
-            <a:ext cx="4393703" cy="369332"/>
-          </a:xfrm>
-          <a:prstGeom prst="rect">
-            <a:avLst/>
-          </a:prstGeom>
-          <a:noFill/>
-        </p:spPr>
-        <p:txBody>
-          <a:bodyPr wrap="none" rtlCol="0">
-            <a:spAutoFit/>
-          </a:bodyPr>
-          <a:lstStyle/>
-          <a:p>
-            <a:r>
-              <a:rPr lang="en-US" dirty="0"/>
-              <a:t>Spike trains generated by probabilistic model</a:t>
-            </a:r>
-          </a:p>
-        </p:txBody>
-      </p:sp>
     </p:spTree>
     <p:extLst>
       <p:ext uri="{BB962C8B-B14F-4D97-AF65-F5344CB8AC3E}">
@@ -3707,10 +3677,10 @@
       </p:grpSpPr>
       <p:pic>
         <p:nvPicPr>
-          <p:cNvPr id="5" name="Picture 4">
-            <a:extLst>
-              <a:ext uri="{FF2B5EF4-FFF2-40B4-BE49-F238E27FC236}">
-                <a16:creationId xmlns:a16="http://schemas.microsoft.com/office/drawing/2014/main" id="{165CF628-9E1A-4B27-B321-D7047F4D1D65}"/>
+          <p:cNvPr id="6" name="Picture 5">
+            <a:extLst>
+              <a:ext uri="{FF2B5EF4-FFF2-40B4-BE49-F238E27FC236}">
+                <a16:creationId xmlns:a16="http://schemas.microsoft.com/office/drawing/2014/main" id="{E0BFA0BD-7FEE-413C-AC1B-9FB00C388C8B}"/>
               </a:ext>
             </a:extLst>
           </p:cNvPr>
@@ -3727,20 +3697,55 @@
         </p:blipFill>
         <p:spPr>
           <a:xfrm>
-            <a:off x="2375941" y="239930"/>
-            <a:ext cx="6558197" cy="3279010"/>
+            <a:off x="429857" y="1857463"/>
+            <a:ext cx="6558197" cy="2954292"/>
           </a:xfrm>
           <a:prstGeom prst="rect">
             <a:avLst/>
           </a:prstGeom>
         </p:spPr>
       </p:pic>
+      <p:sp>
+        <p:nvSpPr>
+          <p:cNvPr id="2" name="TextBox 1">
+            <a:extLst>
+              <a:ext uri="{FF2B5EF4-FFF2-40B4-BE49-F238E27FC236}">
+                <a16:creationId xmlns:a16="http://schemas.microsoft.com/office/drawing/2014/main" id="{26D28041-9326-4266-A9A0-455682D518BB}"/>
+              </a:ext>
+            </a:extLst>
+          </p:cNvPr>
+          <p:cNvSpPr txBox="1"/>
+          <p:nvPr/>
+        </p:nvSpPr>
+        <p:spPr>
+          <a:xfrm>
+            <a:off x="2837081" y="5226081"/>
+            <a:ext cx="1743747" cy="369332"/>
+          </a:xfrm>
+          <a:prstGeom prst="rect">
+            <a:avLst/>
+          </a:prstGeom>
+          <a:noFill/>
+        </p:spPr>
+        <p:txBody>
+          <a:bodyPr wrap="none" rtlCol="0">
+            <a:spAutoFit/>
+          </a:bodyPr>
+          <a:lstStyle/>
+          <a:p>
+            <a:r>
+              <a:rPr lang="en-US" dirty="0"/>
+              <a:t>450k data points</a:t>
+            </a:r>
+          </a:p>
+        </p:txBody>
+      </p:sp>
       <p:pic>
         <p:nvPicPr>
-          <p:cNvPr id="6" name="Picture 5">
-            <a:extLst>
-              <a:ext uri="{FF2B5EF4-FFF2-40B4-BE49-F238E27FC236}">
-                <a16:creationId xmlns:a16="http://schemas.microsoft.com/office/drawing/2014/main" id="{E0BFA0BD-7FEE-413C-AC1B-9FB00C388C8B}"/>
+          <p:cNvPr id="7" name="Picture 6">
+            <a:extLst>
+              <a:ext uri="{FF2B5EF4-FFF2-40B4-BE49-F238E27FC236}">
+                <a16:creationId xmlns:a16="http://schemas.microsoft.com/office/drawing/2014/main" id="{61DCA2A3-B0C3-4507-AB58-E2B8B1D456E9}"/>
               </a:ext>
             </a:extLst>
           </p:cNvPr>
@@ -3757,8 +3762,8 @@
         </p:blipFill>
         <p:spPr>
           <a:xfrm>
-            <a:off x="2375941" y="3601386"/>
-            <a:ext cx="6558197" cy="2954292"/>
+            <a:off x="7410276" y="1202425"/>
+            <a:ext cx="4351867" cy="4453150"/>
           </a:xfrm>
           <a:prstGeom prst="rect">
             <a:avLst/>
@@ -4005,8 +4010,38 @@
         </p:blipFill>
         <p:spPr>
           <a:xfrm>
-            <a:off x="3143330" y="0"/>
+            <a:off x="5316903" y="0"/>
             <a:ext cx="5905340" cy="6858000"/>
+          </a:xfrm>
+          <a:prstGeom prst="rect">
+            <a:avLst/>
+          </a:prstGeom>
+        </p:spPr>
+      </p:pic>
+      <p:pic>
+        <p:nvPicPr>
+          <p:cNvPr id="3" name="Picture 2">
+            <a:extLst>
+              <a:ext uri="{FF2B5EF4-FFF2-40B4-BE49-F238E27FC236}">
+                <a16:creationId xmlns:a16="http://schemas.microsoft.com/office/drawing/2014/main" id="{131A0DF2-3215-4D91-9DDA-E3A10EBCBFD0}"/>
+              </a:ext>
+            </a:extLst>
+          </p:cNvPr>
+          <p:cNvPicPr>
+            <a:picLocks noChangeAspect="1"/>
+          </p:cNvPicPr>
+          <p:nvPr/>
+        </p:nvPicPr>
+        <p:blipFill>
+          <a:blip r:embed="rId3"/>
+          <a:stretch>
+            <a:fillRect/>
+          </a:stretch>
+        </p:blipFill>
+        <p:spPr>
+          <a:xfrm>
+            <a:off x="452596" y="2153973"/>
+            <a:ext cx="4182534" cy="2678650"/>
           </a:xfrm>
           <a:prstGeom prst="rect">
             <a:avLst/>

</xml_diff>